<commit_message>
Final version of analysis slide and pdf
</commit_message>
<xml_diff>
--- a/lendingclubcasestudy.pptx
+++ b/lendingclubcasestudy.pptx
@@ -18,6 +18,18 @@
     <p:sldId id="269" r:id="rId12"/>
     <p:sldId id="270" r:id="rId13"/>
     <p:sldId id="272" r:id="rId14"/>
+    <p:sldId id="273" r:id="rId15"/>
+    <p:sldId id="274" r:id="rId16"/>
+    <p:sldId id="275" r:id="rId17"/>
+    <p:sldId id="279" r:id="rId18"/>
+    <p:sldId id="281" r:id="rId19"/>
+    <p:sldId id="282" r:id="rId20"/>
+    <p:sldId id="283" r:id="rId21"/>
+    <p:sldId id="284" r:id="rId22"/>
+    <p:sldId id="285" r:id="rId23"/>
+    <p:sldId id="287" r:id="rId24"/>
+    <p:sldId id="288" r:id="rId25"/>
+    <p:sldId id="289" r:id="rId26"/>
   </p:sldIdLst>
   <p:sldSz cx="12192000" cy="6858000"/>
   <p:notesSz cx="6858000" cy="9144000"/>
@@ -4499,7 +4511,7 @@
         <p:spPr>
           <a:xfrm>
             <a:off x="1069848" y="2871988"/>
-            <a:ext cx="10058400" cy="2601533"/>
+            <a:ext cx="9696890" cy="2601533"/>
           </a:xfrm>
         </p:spPr>
         <p:txBody>
@@ -5105,35 +5117,27 @@
           </a:p>
           <a:p>
             <a:r>
-              <a:rPr lang="en-IN" i="1" dirty="0"/>
+              <a:rPr lang="en-IN" sz="1800" i="1" dirty="0"/>
               <a:t>We see annual income is positively correlated with both Charged off and Fully Paid. </a:t>
             </a:r>
           </a:p>
           <a:p>
             <a:r>
-              <a:rPr lang="en-IN" i="1" dirty="0"/>
+              <a:rPr lang="en-IN" sz="1800" i="1" dirty="0"/>
               <a:t>We also see if annual income is in range of 40001 to 60000 then chances of becoming defaulter is higher.</a:t>
             </a:r>
             <a:r>
-              <a:rPr lang="en-IN" dirty="0"/>
+              <a:rPr lang="en-IN" sz="1800" dirty="0"/>
               <a:t> </a:t>
             </a:r>
-            <a:endParaRPr lang="en-IN" i="1" dirty="0"/>
-          </a:p>
-          <a:p>
-            <a:r>
-              <a:rPr lang="en-IN" i="1" dirty="0"/>
-              <a:t>Looking at the ratio of say charged off/ Fully Paid , say </a:t>
-            </a:r>
-            <a:r>
-              <a:rPr lang="en-IN" i="1"/>
-              <a:t>for the range 0-20000 has </a:t>
-            </a:r>
-            <a:r>
-              <a:rPr lang="en-IN" i="1" dirty="0"/>
-              <a:t>higher chances of becoming defaulter.</a:t>
-            </a:r>
-            <a:endParaRPr lang="en-US" dirty="0"/>
+            <a:endParaRPr lang="en-IN" sz="1800" i="1" dirty="0"/>
+          </a:p>
+          <a:p>
+            <a:r>
+              <a:rPr lang="en-IN" sz="1800" i="1" dirty="0"/>
+              <a:t>Looking at the ratio of say charged off/ Fully Paid , say for the range 0-20000 has higher chances of becoming defaulter.</a:t>
+            </a:r>
+            <a:endParaRPr lang="en-US" sz="1800" dirty="0"/>
           </a:p>
         </p:txBody>
       </p:sp>
@@ -5180,6 +5184,987 @@
 </p:sld>
 </file>
 
+<file path=ppt/slides/slide14.xml><?xml version="1.0" encoding="utf-8"?>
+<p:sld xmlns:a="http://schemas.openxmlformats.org/drawingml/2006/main" xmlns:r="http://schemas.openxmlformats.org/officeDocument/2006/relationships" xmlns:p="http://schemas.openxmlformats.org/presentationml/2006/main">
+  <p:cSld>
+    <p:spTree>
+      <p:nvGrpSpPr>
+        <p:cNvPr id="1" name=""/>
+        <p:cNvGrpSpPr/>
+        <p:nvPr/>
+      </p:nvGrpSpPr>
+      <p:grpSpPr>
+        <a:xfrm>
+          <a:off x="0" y="0"/>
+          <a:ext cx="0" cy="0"/>
+          <a:chOff x="0" y="0"/>
+          <a:chExt cx="0" cy="0"/>
+        </a:xfrm>
+      </p:grpSpPr>
+      <p:sp>
+        <p:nvSpPr>
+          <p:cNvPr id="3" name="Content Placeholder 2">
+            <a:extLst>
+              <a:ext uri="{FF2B5EF4-FFF2-40B4-BE49-F238E27FC236}">
+                <a16:creationId xmlns:a16="http://schemas.microsoft.com/office/drawing/2014/main" id="{9DD7D970-6B79-C4B7-51BA-69013ECE8DDD}"/>
+              </a:ext>
+            </a:extLst>
+          </p:cNvPr>
+          <p:cNvSpPr>
+            <a:spLocks noGrp="1"/>
+          </p:cNvSpPr>
+          <p:nvPr>
+            <p:ph idx="1"/>
+          </p:nvPr>
+        </p:nvSpPr>
+        <p:spPr>
+          <a:xfrm>
+            <a:off x="1069848" y="244699"/>
+            <a:ext cx="10058400" cy="5927501"/>
+          </a:xfrm>
+        </p:spPr>
+        <p:txBody>
+          <a:bodyPr/>
+          <a:lstStyle/>
+          <a:p>
+            <a:endParaRPr lang="en-US" dirty="0"/>
+          </a:p>
+          <a:p>
+            <a:endParaRPr lang="en-US" dirty="0"/>
+          </a:p>
+          <a:p>
+            <a:endParaRPr lang="en-US" dirty="0"/>
+          </a:p>
+          <a:p>
+            <a:endParaRPr lang="en-US" dirty="0"/>
+          </a:p>
+          <a:p>
+            <a:endParaRPr lang="en-US" dirty="0"/>
+          </a:p>
+          <a:p>
+            <a:endParaRPr lang="en-US" dirty="0"/>
+          </a:p>
+          <a:p>
+            <a:endParaRPr lang="en-US" dirty="0"/>
+          </a:p>
+          <a:p>
+            <a:endParaRPr lang="en-US" dirty="0"/>
+          </a:p>
+          <a:p>
+            <a:endParaRPr lang="en-US" dirty="0"/>
+          </a:p>
+          <a:p>
+            <a:pPr marL="0" indent="0">
+              <a:buNone/>
+            </a:pPr>
+            <a:endParaRPr lang="en-US" dirty="0"/>
+          </a:p>
+          <a:p>
+            <a:r>
+              <a:rPr lang="en-IN" sz="1800" i="1" dirty="0"/>
+              <a:t>We see </a:t>
+            </a:r>
+            <a:r>
+              <a:rPr lang="en-IN" sz="1800" i="1" dirty="0" err="1"/>
+              <a:t>dti</a:t>
+            </a:r>
+            <a:r>
+              <a:rPr lang="en-IN" sz="1800" i="1" dirty="0"/>
+              <a:t> is positively correlated with both Charged off and Fully Paid.</a:t>
+            </a:r>
+          </a:p>
+          <a:p>
+            <a:r>
+              <a:rPr lang="en-IN" sz="1800" i="1" dirty="0"/>
+              <a:t>We also see if </a:t>
+            </a:r>
+            <a:r>
+              <a:rPr lang="en-IN" sz="1800" i="1" dirty="0" err="1"/>
+              <a:t>dti</a:t>
+            </a:r>
+            <a:r>
+              <a:rPr lang="en-IN" sz="1800" i="1" dirty="0"/>
+              <a:t> is in range of either 11 to 15 or 16-20 then chances of becoming defaulter is higher. </a:t>
+            </a:r>
+            <a:endParaRPr lang="en-US" sz="1800" dirty="0"/>
+          </a:p>
+        </p:txBody>
+      </p:sp>
+      <p:pic>
+        <p:nvPicPr>
+          <p:cNvPr id="5" name="Picture 4" descr="Chart, bar chart&#10;&#10;Description automatically generated">
+            <a:extLst>
+              <a:ext uri="{FF2B5EF4-FFF2-40B4-BE49-F238E27FC236}">
+                <a16:creationId xmlns:a16="http://schemas.microsoft.com/office/drawing/2014/main" id="{BB1C1007-2DCC-2154-0A1F-FCEC7C02BBD1}"/>
+              </a:ext>
+            </a:extLst>
+          </p:cNvPr>
+          <p:cNvPicPr>
+            <a:picLocks noChangeAspect="1"/>
+          </p:cNvPicPr>
+          <p:nvPr/>
+        </p:nvPicPr>
+        <p:blipFill>
+          <a:blip r:embed="rId2"/>
+          <a:stretch>
+            <a:fillRect/>
+          </a:stretch>
+        </p:blipFill>
+        <p:spPr>
+          <a:xfrm>
+            <a:off x="609600" y="273050"/>
+            <a:ext cx="10972800" cy="4170161"/>
+          </a:xfrm>
+          <a:prstGeom prst="rect">
+            <a:avLst/>
+          </a:prstGeom>
+        </p:spPr>
+      </p:pic>
+    </p:spTree>
+    <p:extLst>
+      <p:ext uri="{BB962C8B-B14F-4D97-AF65-F5344CB8AC3E}">
+        <p14:creationId xmlns:p14="http://schemas.microsoft.com/office/powerpoint/2010/main" val="1039662965"/>
+      </p:ext>
+    </p:extLst>
+  </p:cSld>
+  <p:clrMapOvr>
+    <a:masterClrMapping/>
+  </p:clrMapOvr>
+</p:sld>
+</file>
+
+<file path=ppt/slides/slide15.xml><?xml version="1.0" encoding="utf-8"?>
+<p:sld xmlns:a="http://schemas.openxmlformats.org/drawingml/2006/main" xmlns:r="http://schemas.openxmlformats.org/officeDocument/2006/relationships" xmlns:p="http://schemas.openxmlformats.org/presentationml/2006/main">
+  <p:cSld>
+    <p:spTree>
+      <p:nvGrpSpPr>
+        <p:cNvPr id="1" name=""/>
+        <p:cNvGrpSpPr/>
+        <p:nvPr/>
+      </p:nvGrpSpPr>
+      <p:grpSpPr>
+        <a:xfrm>
+          <a:off x="0" y="0"/>
+          <a:ext cx="0" cy="0"/>
+          <a:chOff x="0" y="0"/>
+          <a:chExt cx="0" cy="0"/>
+        </a:xfrm>
+      </p:grpSpPr>
+      <p:sp>
+        <p:nvSpPr>
+          <p:cNvPr id="3" name="Content Placeholder 2">
+            <a:extLst>
+              <a:ext uri="{FF2B5EF4-FFF2-40B4-BE49-F238E27FC236}">
+                <a16:creationId xmlns:a16="http://schemas.microsoft.com/office/drawing/2014/main" id="{79E82562-8121-05CD-80DF-D6A44FE5FB5E}"/>
+              </a:ext>
+            </a:extLst>
+          </p:cNvPr>
+          <p:cNvSpPr>
+            <a:spLocks noGrp="1"/>
+          </p:cNvSpPr>
+          <p:nvPr>
+            <p:ph idx="1"/>
+          </p:nvPr>
+        </p:nvSpPr>
+        <p:spPr>
+          <a:xfrm>
+            <a:off x="1069848" y="193183"/>
+            <a:ext cx="10058400" cy="5979017"/>
+          </a:xfrm>
+        </p:spPr>
+        <p:txBody>
+          <a:bodyPr/>
+          <a:lstStyle/>
+          <a:p>
+            <a:endParaRPr lang="en-US" dirty="0"/>
+          </a:p>
+          <a:p>
+            <a:endParaRPr lang="en-US" dirty="0"/>
+          </a:p>
+          <a:p>
+            <a:endParaRPr lang="en-US" dirty="0"/>
+          </a:p>
+          <a:p>
+            <a:endParaRPr lang="en-US" dirty="0"/>
+          </a:p>
+          <a:p>
+            <a:endParaRPr lang="en-US" dirty="0"/>
+          </a:p>
+          <a:p>
+            <a:endParaRPr lang="en-US" dirty="0"/>
+          </a:p>
+          <a:p>
+            <a:endParaRPr lang="en-US" dirty="0"/>
+          </a:p>
+          <a:p>
+            <a:endParaRPr lang="en-US" dirty="0"/>
+          </a:p>
+          <a:p>
+            <a:endParaRPr lang="en-US" dirty="0"/>
+          </a:p>
+          <a:p>
+            <a:pPr marL="0" indent="0">
+              <a:buNone/>
+            </a:pPr>
+            <a:endParaRPr lang="en-US" dirty="0"/>
+          </a:p>
+          <a:p>
+            <a:endParaRPr lang="en-US" dirty="0"/>
+          </a:p>
+          <a:p>
+            <a:r>
+              <a:rPr lang="en-IN" sz="1800" i="1" dirty="0"/>
+              <a:t>We see loan term is positively correlated with both Charged off and Fully Paid. </a:t>
+            </a:r>
+          </a:p>
+          <a:p>
+            <a:r>
+              <a:rPr lang="en-IN" sz="1800" i="1" dirty="0"/>
+              <a:t>We also see if term is 36 months then chances of becoming defaulter is higher.</a:t>
+            </a:r>
+          </a:p>
+          <a:p>
+            <a:r>
+              <a:rPr lang="en-IN" sz="1800" i="1" dirty="0"/>
+              <a:t> But ratio wise 60 months has much higher number and hence higher chances of defaulters.</a:t>
+            </a:r>
+            <a:endParaRPr lang="en-US" sz="1800" dirty="0"/>
+          </a:p>
+        </p:txBody>
+      </p:sp>
+      <p:pic>
+        <p:nvPicPr>
+          <p:cNvPr id="5" name="Picture 4" descr="Chart, bar chart&#10;&#10;Description automatically generated">
+            <a:extLst>
+              <a:ext uri="{FF2B5EF4-FFF2-40B4-BE49-F238E27FC236}">
+                <a16:creationId xmlns:a16="http://schemas.microsoft.com/office/drawing/2014/main" id="{D0D8D69A-7285-B497-5083-B63A0ACA0314}"/>
+              </a:ext>
+            </a:extLst>
+          </p:cNvPr>
+          <p:cNvPicPr>
+            <a:picLocks noChangeAspect="1"/>
+          </p:cNvPicPr>
+          <p:nvPr/>
+        </p:nvPicPr>
+        <p:blipFill>
+          <a:blip r:embed="rId2"/>
+          <a:stretch>
+            <a:fillRect/>
+          </a:stretch>
+        </p:blipFill>
+        <p:spPr>
+          <a:xfrm>
+            <a:off x="711200" y="298450"/>
+            <a:ext cx="10769600" cy="4286429"/>
+          </a:xfrm>
+          <a:prstGeom prst="rect">
+            <a:avLst/>
+          </a:prstGeom>
+        </p:spPr>
+      </p:pic>
+    </p:spTree>
+    <p:extLst>
+      <p:ext uri="{BB962C8B-B14F-4D97-AF65-F5344CB8AC3E}">
+        <p14:creationId xmlns:p14="http://schemas.microsoft.com/office/powerpoint/2010/main" val="3895900476"/>
+      </p:ext>
+    </p:extLst>
+  </p:cSld>
+  <p:clrMapOvr>
+    <a:masterClrMapping/>
+  </p:clrMapOvr>
+</p:sld>
+</file>
+
+<file path=ppt/slides/slide16.xml><?xml version="1.0" encoding="utf-8"?>
+<p:sld xmlns:a="http://schemas.openxmlformats.org/drawingml/2006/main" xmlns:r="http://schemas.openxmlformats.org/officeDocument/2006/relationships" xmlns:p="http://schemas.openxmlformats.org/presentationml/2006/main">
+  <p:cSld>
+    <p:spTree>
+      <p:nvGrpSpPr>
+        <p:cNvPr id="1" name=""/>
+        <p:cNvGrpSpPr/>
+        <p:nvPr/>
+      </p:nvGrpSpPr>
+      <p:grpSpPr>
+        <a:xfrm>
+          <a:off x="0" y="0"/>
+          <a:ext cx="0" cy="0"/>
+          <a:chOff x="0" y="0"/>
+          <a:chExt cx="0" cy="0"/>
+        </a:xfrm>
+      </p:grpSpPr>
+      <p:sp>
+        <p:nvSpPr>
+          <p:cNvPr id="3" name="Content Placeholder 2">
+            <a:extLst>
+              <a:ext uri="{FF2B5EF4-FFF2-40B4-BE49-F238E27FC236}">
+                <a16:creationId xmlns:a16="http://schemas.microsoft.com/office/drawing/2014/main" id="{B94146B9-BD72-5C56-3163-CAA22A8F3797}"/>
+              </a:ext>
+            </a:extLst>
+          </p:cNvPr>
+          <p:cNvSpPr>
+            <a:spLocks noGrp="1"/>
+          </p:cNvSpPr>
+          <p:nvPr>
+            <p:ph idx="1"/>
+          </p:nvPr>
+        </p:nvSpPr>
+        <p:spPr>
+          <a:xfrm>
+            <a:off x="1069848" y="412124"/>
+            <a:ext cx="10058400" cy="5760076"/>
+          </a:xfrm>
+        </p:spPr>
+        <p:txBody>
+          <a:bodyPr>
+            <a:normAutofit fontScale="55000" lnSpcReduction="20000"/>
+          </a:bodyPr>
+          <a:lstStyle/>
+          <a:p>
+            <a:endParaRPr lang="en-US" dirty="0"/>
+          </a:p>
+          <a:p>
+            <a:endParaRPr lang="en-US" dirty="0"/>
+          </a:p>
+          <a:p>
+            <a:endParaRPr lang="en-US" dirty="0"/>
+          </a:p>
+          <a:p>
+            <a:endParaRPr lang="en-US" dirty="0"/>
+          </a:p>
+          <a:p>
+            <a:endParaRPr lang="en-US" dirty="0"/>
+          </a:p>
+          <a:p>
+            <a:endParaRPr lang="en-US" dirty="0"/>
+          </a:p>
+          <a:p>
+            <a:endParaRPr lang="en-US" dirty="0"/>
+          </a:p>
+          <a:p>
+            <a:endParaRPr lang="en-US" dirty="0"/>
+          </a:p>
+          <a:p>
+            <a:endParaRPr lang="en-US" dirty="0"/>
+          </a:p>
+          <a:p>
+            <a:pPr marL="0" indent="0">
+              <a:buNone/>
+            </a:pPr>
+            <a:endParaRPr lang="en-US" dirty="0"/>
+          </a:p>
+          <a:p>
+            <a:pPr marL="0" indent="0">
+              <a:buNone/>
+            </a:pPr>
+            <a:endParaRPr lang="en-US" dirty="0"/>
+          </a:p>
+          <a:p>
+            <a:pPr marL="0" indent="0">
+              <a:buNone/>
+            </a:pPr>
+            <a:endParaRPr lang="en-US" dirty="0"/>
+          </a:p>
+          <a:p>
+            <a:pPr marL="0" indent="0">
+              <a:buNone/>
+            </a:pPr>
+            <a:endParaRPr lang="en-US" dirty="0"/>
+          </a:p>
+          <a:p>
+            <a:pPr marL="0" indent="0">
+              <a:buNone/>
+            </a:pPr>
+            <a:endParaRPr lang="en-US" dirty="0"/>
+          </a:p>
+          <a:p>
+            <a:pPr marL="0" indent="0">
+              <a:buNone/>
+            </a:pPr>
+            <a:endParaRPr lang="en-US" dirty="0"/>
+          </a:p>
+          <a:p>
+            <a:endParaRPr lang="en-IN" sz="2900" i="1" dirty="0"/>
+          </a:p>
+          <a:p>
+            <a:r>
+              <a:rPr lang="en-IN" sz="2900" i="1" dirty="0"/>
+              <a:t>We see grade is positively correlated with both Charged off and Fully Paid. </a:t>
+            </a:r>
+          </a:p>
+          <a:p>
+            <a:r>
+              <a:rPr lang="en-IN" sz="2900" i="1" dirty="0"/>
+              <a:t>We also see if grade is B, then chances of becoming defaulter is higher.</a:t>
+            </a:r>
+          </a:p>
+          <a:p>
+            <a:r>
+              <a:rPr lang="en-IN" sz="2900" i="1" dirty="0"/>
+              <a:t> But ratio wise G has higher chances of being defaulter.</a:t>
+            </a:r>
+            <a:r>
+              <a:rPr lang="en-IN" sz="2900" dirty="0"/>
+              <a:t> </a:t>
+            </a:r>
+          </a:p>
+          <a:p>
+            <a:pPr marL="0" indent="0">
+              <a:buNone/>
+            </a:pPr>
+            <a:br>
+              <a:rPr lang="en-IN" dirty="0"/>
+            </a:br>
+            <a:endParaRPr lang="en-IN" dirty="0"/>
+          </a:p>
+          <a:p>
+            <a:endParaRPr lang="en-US" dirty="0"/>
+          </a:p>
+        </p:txBody>
+      </p:sp>
+      <p:pic>
+        <p:nvPicPr>
+          <p:cNvPr id="5" name="Picture 4" descr="Chart, bar chart&#10;&#10;Description automatically generated">
+            <a:extLst>
+              <a:ext uri="{FF2B5EF4-FFF2-40B4-BE49-F238E27FC236}">
+                <a16:creationId xmlns:a16="http://schemas.microsoft.com/office/drawing/2014/main" id="{8C5F2A41-0EDF-C44A-F4F8-EA0D77B100FD}"/>
+              </a:ext>
+            </a:extLst>
+          </p:cNvPr>
+          <p:cNvPicPr>
+            <a:picLocks noChangeAspect="1"/>
+          </p:cNvPicPr>
+          <p:nvPr/>
+        </p:nvPicPr>
+        <p:blipFill>
+          <a:blip r:embed="rId2"/>
+          <a:stretch>
+            <a:fillRect/>
+          </a:stretch>
+        </p:blipFill>
+        <p:spPr>
+          <a:xfrm>
+            <a:off x="717550" y="298450"/>
+            <a:ext cx="10756900" cy="4286429"/>
+          </a:xfrm>
+          <a:prstGeom prst="rect">
+            <a:avLst/>
+          </a:prstGeom>
+        </p:spPr>
+      </p:pic>
+    </p:spTree>
+    <p:extLst>
+      <p:ext uri="{BB962C8B-B14F-4D97-AF65-F5344CB8AC3E}">
+        <p14:creationId xmlns:p14="http://schemas.microsoft.com/office/powerpoint/2010/main" val="4067593759"/>
+      </p:ext>
+    </p:extLst>
+  </p:cSld>
+  <p:clrMapOvr>
+    <a:masterClrMapping/>
+  </p:clrMapOvr>
+</p:sld>
+</file>
+
+<file path=ppt/slides/slide17.xml><?xml version="1.0" encoding="utf-8"?>
+<p:sld xmlns:a="http://schemas.openxmlformats.org/drawingml/2006/main" xmlns:r="http://schemas.openxmlformats.org/officeDocument/2006/relationships" xmlns:p="http://schemas.openxmlformats.org/presentationml/2006/main">
+  <p:cSld>
+    <p:spTree>
+      <p:nvGrpSpPr>
+        <p:cNvPr id="1" name=""/>
+        <p:cNvGrpSpPr/>
+        <p:nvPr/>
+      </p:nvGrpSpPr>
+      <p:grpSpPr>
+        <a:xfrm>
+          <a:off x="0" y="0"/>
+          <a:ext cx="0" cy="0"/>
+          <a:chOff x="0" y="0"/>
+          <a:chExt cx="0" cy="0"/>
+        </a:xfrm>
+      </p:grpSpPr>
+      <p:sp>
+        <p:nvSpPr>
+          <p:cNvPr id="3" name="Content Placeholder 2">
+            <a:extLst>
+              <a:ext uri="{FF2B5EF4-FFF2-40B4-BE49-F238E27FC236}">
+                <a16:creationId xmlns:a16="http://schemas.microsoft.com/office/drawing/2014/main" id="{B94146B9-BD72-5C56-3163-CAA22A8F3797}"/>
+              </a:ext>
+            </a:extLst>
+          </p:cNvPr>
+          <p:cNvSpPr>
+            <a:spLocks noGrp="1"/>
+          </p:cNvSpPr>
+          <p:nvPr>
+            <p:ph idx="1"/>
+          </p:nvPr>
+        </p:nvSpPr>
+        <p:spPr>
+          <a:xfrm>
+            <a:off x="1069848" y="412124"/>
+            <a:ext cx="10058400" cy="5760076"/>
+          </a:xfrm>
+        </p:spPr>
+        <p:txBody>
+          <a:bodyPr>
+            <a:normAutofit fontScale="70000" lnSpcReduction="20000"/>
+          </a:bodyPr>
+          <a:lstStyle/>
+          <a:p>
+            <a:endParaRPr lang="en-US" dirty="0"/>
+          </a:p>
+          <a:p>
+            <a:endParaRPr lang="en-US" dirty="0"/>
+          </a:p>
+          <a:p>
+            <a:endParaRPr lang="en-US" dirty="0"/>
+          </a:p>
+          <a:p>
+            <a:endParaRPr lang="en-US" dirty="0"/>
+          </a:p>
+          <a:p>
+            <a:endParaRPr lang="en-US" dirty="0"/>
+          </a:p>
+          <a:p>
+            <a:endParaRPr lang="en-US" dirty="0"/>
+          </a:p>
+          <a:p>
+            <a:endParaRPr lang="en-US" dirty="0"/>
+          </a:p>
+          <a:p>
+            <a:endParaRPr lang="en-US" dirty="0"/>
+          </a:p>
+          <a:p>
+            <a:endParaRPr lang="en-US" dirty="0"/>
+          </a:p>
+          <a:p>
+            <a:pPr marL="0" indent="0">
+              <a:buNone/>
+            </a:pPr>
+            <a:endParaRPr lang="en-US" dirty="0"/>
+          </a:p>
+          <a:p>
+            <a:pPr marL="0" indent="0">
+              <a:buNone/>
+            </a:pPr>
+            <a:endParaRPr lang="en-US" dirty="0"/>
+          </a:p>
+          <a:p>
+            <a:pPr marL="0" indent="0">
+              <a:buNone/>
+            </a:pPr>
+            <a:endParaRPr lang="en-US" dirty="0"/>
+          </a:p>
+          <a:p>
+            <a:pPr marL="0" indent="0">
+              <a:buNone/>
+            </a:pPr>
+            <a:endParaRPr lang="en-US" dirty="0"/>
+          </a:p>
+          <a:p>
+            <a:pPr marL="0" indent="0">
+              <a:buNone/>
+            </a:pPr>
+            <a:endParaRPr lang="en-IN" sz="2900" i="1" dirty="0"/>
+          </a:p>
+          <a:p>
+            <a:r>
+              <a:rPr lang="en-IN" sz="2600" i="1" dirty="0"/>
+              <a:t>We see employment length is positively correlated with both Charged off and Fully Paid. </a:t>
+            </a:r>
+          </a:p>
+          <a:p>
+            <a:r>
+              <a:rPr lang="en-IN" sz="2600" i="1" dirty="0"/>
+              <a:t>Basically, employment length may not be a good criteria to detect Defaulters.</a:t>
+            </a:r>
+          </a:p>
+          <a:p>
+            <a:r>
+              <a:rPr lang="en-IN" sz="2600" i="1" dirty="0"/>
+              <a:t>Also, we see that Employees who have exp 10+, 0, 2 &amp; 3 years are likely to become Defaulters.</a:t>
+            </a:r>
+            <a:br>
+              <a:rPr lang="en-IN" dirty="0"/>
+            </a:br>
+            <a:endParaRPr lang="en-IN" dirty="0"/>
+          </a:p>
+          <a:p>
+            <a:endParaRPr lang="en-US" dirty="0"/>
+          </a:p>
+        </p:txBody>
+      </p:sp>
+      <p:pic>
+        <p:nvPicPr>
+          <p:cNvPr id="4" name="Picture 3">
+            <a:extLst>
+              <a:ext uri="{FF2B5EF4-FFF2-40B4-BE49-F238E27FC236}">
+                <a16:creationId xmlns:a16="http://schemas.microsoft.com/office/drawing/2014/main" id="{D5390800-D6F2-4099-A5BB-A714B735AE01}"/>
+              </a:ext>
+            </a:extLst>
+          </p:cNvPr>
+          <p:cNvPicPr>
+            <a:picLocks noChangeAspect="1"/>
+          </p:cNvPicPr>
+          <p:nvPr/>
+        </p:nvPicPr>
+        <p:blipFill>
+          <a:blip r:embed="rId2"/>
+          <a:stretch>
+            <a:fillRect/>
+          </a:stretch>
+        </p:blipFill>
+        <p:spPr>
+          <a:xfrm>
+            <a:off x="762000" y="279400"/>
+            <a:ext cx="10668000" cy="4138054"/>
+          </a:xfrm>
+          <a:prstGeom prst="rect">
+            <a:avLst/>
+          </a:prstGeom>
+        </p:spPr>
+      </p:pic>
+    </p:spTree>
+    <p:extLst>
+      <p:ext uri="{BB962C8B-B14F-4D97-AF65-F5344CB8AC3E}">
+        <p14:creationId xmlns:p14="http://schemas.microsoft.com/office/powerpoint/2010/main" val="2415690505"/>
+      </p:ext>
+    </p:extLst>
+  </p:cSld>
+  <p:clrMapOvr>
+    <a:masterClrMapping/>
+  </p:clrMapOvr>
+</p:sld>
+</file>
+
+<file path=ppt/slides/slide18.xml><?xml version="1.0" encoding="utf-8"?>
+<p:sld xmlns:a="http://schemas.openxmlformats.org/drawingml/2006/main" xmlns:r="http://schemas.openxmlformats.org/officeDocument/2006/relationships" xmlns:p="http://schemas.openxmlformats.org/presentationml/2006/main">
+  <p:cSld>
+    <p:spTree>
+      <p:nvGrpSpPr>
+        <p:cNvPr id="1" name=""/>
+        <p:cNvGrpSpPr/>
+        <p:nvPr/>
+      </p:nvGrpSpPr>
+      <p:grpSpPr>
+        <a:xfrm>
+          <a:off x="0" y="0"/>
+          <a:ext cx="0" cy="0"/>
+          <a:chOff x="0" y="0"/>
+          <a:chExt cx="0" cy="0"/>
+        </a:xfrm>
+      </p:grpSpPr>
+      <p:sp>
+        <p:nvSpPr>
+          <p:cNvPr id="3" name="Content Placeholder 2">
+            <a:extLst>
+              <a:ext uri="{FF2B5EF4-FFF2-40B4-BE49-F238E27FC236}">
+                <a16:creationId xmlns:a16="http://schemas.microsoft.com/office/drawing/2014/main" id="{B94146B9-BD72-5C56-3163-CAA22A8F3797}"/>
+              </a:ext>
+            </a:extLst>
+          </p:cNvPr>
+          <p:cNvSpPr>
+            <a:spLocks noGrp="1"/>
+          </p:cNvSpPr>
+          <p:nvPr>
+            <p:ph idx="1"/>
+          </p:nvPr>
+        </p:nvSpPr>
+        <p:spPr>
+          <a:xfrm>
+            <a:off x="1069848" y="412124"/>
+            <a:ext cx="10058400" cy="5760076"/>
+          </a:xfrm>
+        </p:spPr>
+        <p:txBody>
+          <a:bodyPr>
+            <a:normAutofit fontScale="77500" lnSpcReduction="20000"/>
+          </a:bodyPr>
+          <a:lstStyle/>
+          <a:p>
+            <a:endParaRPr lang="en-US" dirty="0"/>
+          </a:p>
+          <a:p>
+            <a:endParaRPr lang="en-US" dirty="0"/>
+          </a:p>
+          <a:p>
+            <a:endParaRPr lang="en-US" dirty="0"/>
+          </a:p>
+          <a:p>
+            <a:endParaRPr lang="en-US" dirty="0"/>
+          </a:p>
+          <a:p>
+            <a:endParaRPr lang="en-US" dirty="0"/>
+          </a:p>
+          <a:p>
+            <a:endParaRPr lang="en-US" dirty="0"/>
+          </a:p>
+          <a:p>
+            <a:endParaRPr lang="en-US" dirty="0"/>
+          </a:p>
+          <a:p>
+            <a:endParaRPr lang="en-US" dirty="0"/>
+          </a:p>
+          <a:p>
+            <a:endParaRPr lang="en-US" dirty="0"/>
+          </a:p>
+          <a:p>
+            <a:pPr marL="0" indent="0">
+              <a:buNone/>
+            </a:pPr>
+            <a:endParaRPr lang="en-US" dirty="0"/>
+          </a:p>
+          <a:p>
+            <a:pPr marL="0" indent="0">
+              <a:buNone/>
+            </a:pPr>
+            <a:endParaRPr lang="en-US" dirty="0"/>
+          </a:p>
+          <a:p>
+            <a:pPr marL="0" indent="0">
+              <a:buNone/>
+            </a:pPr>
+            <a:endParaRPr lang="en-US" dirty="0"/>
+          </a:p>
+          <a:p>
+            <a:pPr marL="0" indent="0">
+              <a:buNone/>
+            </a:pPr>
+            <a:endParaRPr lang="en-US" dirty="0"/>
+          </a:p>
+          <a:p>
+            <a:pPr marL="0" indent="0">
+              <a:buNone/>
+            </a:pPr>
+            <a:endParaRPr lang="en-IN" sz="2900" i="1" dirty="0"/>
+          </a:p>
+          <a:p>
+            <a:r>
+              <a:rPr lang="en-IN" sz="2300" i="1" dirty="0"/>
+              <a:t>We see home ownership is positively correlated with both Charged off and Fully Paid. </a:t>
+            </a:r>
+          </a:p>
+          <a:p>
+            <a:r>
+              <a:rPr lang="en-IN" sz="2300" i="1" dirty="0"/>
+              <a:t>We also see if home ownership is either RENT or MORTGAGE, then chances of becoming defaulter is higher. </a:t>
+            </a:r>
+            <a:br>
+              <a:rPr lang="en-IN" dirty="0"/>
+            </a:br>
+            <a:endParaRPr lang="en-IN" dirty="0"/>
+          </a:p>
+          <a:p>
+            <a:endParaRPr lang="en-US" dirty="0"/>
+          </a:p>
+        </p:txBody>
+      </p:sp>
+      <p:pic>
+        <p:nvPicPr>
+          <p:cNvPr id="5" name="Picture 4" descr="Chart, box and whisker chart&#10;&#10;Description automatically generated">
+            <a:extLst>
+              <a:ext uri="{FF2B5EF4-FFF2-40B4-BE49-F238E27FC236}">
+                <a16:creationId xmlns:a16="http://schemas.microsoft.com/office/drawing/2014/main" id="{857F03CD-5C96-B28C-BFCD-981A95E3F2D7}"/>
+              </a:ext>
+            </a:extLst>
+          </p:cNvPr>
+          <p:cNvPicPr>
+            <a:picLocks noChangeAspect="1"/>
+          </p:cNvPicPr>
+          <p:nvPr/>
+        </p:nvPicPr>
+        <p:blipFill>
+          <a:blip r:embed="rId2"/>
+          <a:stretch>
+            <a:fillRect/>
+          </a:stretch>
+        </p:blipFill>
+        <p:spPr>
+          <a:xfrm>
+            <a:off x="717550" y="298450"/>
+            <a:ext cx="10756900" cy="4466733"/>
+          </a:xfrm>
+          <a:prstGeom prst="rect">
+            <a:avLst/>
+          </a:prstGeom>
+        </p:spPr>
+      </p:pic>
+    </p:spTree>
+    <p:extLst>
+      <p:ext uri="{BB962C8B-B14F-4D97-AF65-F5344CB8AC3E}">
+        <p14:creationId xmlns:p14="http://schemas.microsoft.com/office/powerpoint/2010/main" val="2332045407"/>
+      </p:ext>
+    </p:extLst>
+  </p:cSld>
+  <p:clrMapOvr>
+    <a:masterClrMapping/>
+  </p:clrMapOvr>
+</p:sld>
+</file>
+
+<file path=ppt/slides/slide19.xml><?xml version="1.0" encoding="utf-8"?>
+<p:sld xmlns:a="http://schemas.openxmlformats.org/drawingml/2006/main" xmlns:r="http://schemas.openxmlformats.org/officeDocument/2006/relationships" xmlns:p="http://schemas.openxmlformats.org/presentationml/2006/main">
+  <p:cSld>
+    <p:spTree>
+      <p:nvGrpSpPr>
+        <p:cNvPr id="1" name=""/>
+        <p:cNvGrpSpPr/>
+        <p:nvPr/>
+      </p:nvGrpSpPr>
+      <p:grpSpPr>
+        <a:xfrm>
+          <a:off x="0" y="0"/>
+          <a:ext cx="0" cy="0"/>
+          <a:chOff x="0" y="0"/>
+          <a:chExt cx="0" cy="0"/>
+        </a:xfrm>
+      </p:grpSpPr>
+      <p:sp>
+        <p:nvSpPr>
+          <p:cNvPr id="3" name="Content Placeholder 2">
+            <a:extLst>
+              <a:ext uri="{FF2B5EF4-FFF2-40B4-BE49-F238E27FC236}">
+                <a16:creationId xmlns:a16="http://schemas.microsoft.com/office/drawing/2014/main" id="{B94146B9-BD72-5C56-3163-CAA22A8F3797}"/>
+              </a:ext>
+            </a:extLst>
+          </p:cNvPr>
+          <p:cNvSpPr>
+            <a:spLocks noGrp="1"/>
+          </p:cNvSpPr>
+          <p:nvPr>
+            <p:ph idx="1"/>
+          </p:nvPr>
+        </p:nvSpPr>
+        <p:spPr>
+          <a:xfrm>
+            <a:off x="1069848" y="412124"/>
+            <a:ext cx="10058400" cy="5760076"/>
+          </a:xfrm>
+        </p:spPr>
+        <p:txBody>
+          <a:bodyPr>
+            <a:normAutofit fontScale="85000" lnSpcReduction="20000"/>
+          </a:bodyPr>
+          <a:lstStyle/>
+          <a:p>
+            <a:endParaRPr lang="en-US" dirty="0"/>
+          </a:p>
+          <a:p>
+            <a:endParaRPr lang="en-US" dirty="0"/>
+          </a:p>
+          <a:p>
+            <a:endParaRPr lang="en-US" dirty="0"/>
+          </a:p>
+          <a:p>
+            <a:endParaRPr lang="en-US" dirty="0"/>
+          </a:p>
+          <a:p>
+            <a:endParaRPr lang="en-US" dirty="0"/>
+          </a:p>
+          <a:p>
+            <a:endParaRPr lang="en-US" dirty="0"/>
+          </a:p>
+          <a:p>
+            <a:endParaRPr lang="en-US" dirty="0"/>
+          </a:p>
+          <a:p>
+            <a:endParaRPr lang="en-US" dirty="0"/>
+          </a:p>
+          <a:p>
+            <a:endParaRPr lang="en-US" dirty="0"/>
+          </a:p>
+          <a:p>
+            <a:pPr marL="0" indent="0">
+              <a:buNone/>
+            </a:pPr>
+            <a:endParaRPr lang="en-US" dirty="0"/>
+          </a:p>
+          <a:p>
+            <a:pPr marL="0" indent="0">
+              <a:buNone/>
+            </a:pPr>
+            <a:endParaRPr lang="en-US" dirty="0"/>
+          </a:p>
+          <a:p>
+            <a:pPr marL="0" indent="0">
+              <a:buNone/>
+            </a:pPr>
+            <a:endParaRPr lang="en-US" dirty="0"/>
+          </a:p>
+          <a:p>
+            <a:pPr marL="0" indent="0">
+              <a:buNone/>
+            </a:pPr>
+            <a:endParaRPr lang="en-US" dirty="0"/>
+          </a:p>
+          <a:p>
+            <a:pPr marL="0" indent="0">
+              <a:buNone/>
+            </a:pPr>
+            <a:endParaRPr lang="en-IN" sz="2900" i="1" dirty="0"/>
+          </a:p>
+          <a:p>
+            <a:r>
+              <a:rPr lang="en-IN" sz="2100" i="1" dirty="0"/>
+              <a:t>We see loan issue year is positively correlated with both Charged off and Fully Paid. </a:t>
+            </a:r>
+          </a:p>
+          <a:p>
+            <a:r>
+              <a:rPr lang="en-IN" sz="2100" i="1" dirty="0"/>
+              <a:t>We also see if loan issue year is 2011 then chances of becoming defaulter is higher.</a:t>
+            </a:r>
+            <a:br>
+              <a:rPr lang="en-IN" dirty="0"/>
+            </a:br>
+            <a:endParaRPr lang="en-IN" dirty="0"/>
+          </a:p>
+          <a:p>
+            <a:endParaRPr lang="en-US" dirty="0"/>
+          </a:p>
+        </p:txBody>
+      </p:sp>
+      <p:pic>
+        <p:nvPicPr>
+          <p:cNvPr id="5" name="Picture 4" descr="Chart, bar chart&#10;&#10;Description automatically generated">
+            <a:extLst>
+              <a:ext uri="{FF2B5EF4-FFF2-40B4-BE49-F238E27FC236}">
+                <a16:creationId xmlns:a16="http://schemas.microsoft.com/office/drawing/2014/main" id="{824E4B34-3CDE-A574-6E16-6961A4E936B0}"/>
+              </a:ext>
+            </a:extLst>
+          </p:cNvPr>
+          <p:cNvPicPr>
+            <a:picLocks noChangeAspect="1"/>
+          </p:cNvPicPr>
+          <p:nvPr/>
+        </p:nvPicPr>
+        <p:blipFill>
+          <a:blip r:embed="rId2"/>
+          <a:stretch>
+            <a:fillRect/>
+          </a:stretch>
+        </p:blipFill>
+        <p:spPr>
+          <a:xfrm>
+            <a:off x="704850" y="254000"/>
+            <a:ext cx="10782300" cy="4408152"/>
+          </a:xfrm>
+          <a:prstGeom prst="rect">
+            <a:avLst/>
+          </a:prstGeom>
+        </p:spPr>
+      </p:pic>
+    </p:spTree>
+    <p:extLst>
+      <p:ext uri="{BB962C8B-B14F-4D97-AF65-F5344CB8AC3E}">
+        <p14:creationId xmlns:p14="http://schemas.microsoft.com/office/powerpoint/2010/main" val="1483910332"/>
+      </p:ext>
+    </p:extLst>
+  </p:cSld>
+  <p:clrMapOvr>
+    <a:masterClrMapping/>
+  </p:clrMapOvr>
+</p:sld>
+</file>
+
 <file path=ppt/slides/slide2.xml><?xml version="1.0" encoding="utf-8"?>
 <p:sld xmlns:a="http://schemas.openxmlformats.org/drawingml/2006/main" xmlns:r="http://schemas.openxmlformats.org/officeDocument/2006/relationships" xmlns:p="http://schemas.openxmlformats.org/presentationml/2006/main">
   <p:cSld>
@@ -5272,6 +6257,993 @@
     <p:extLst>
       <p:ext uri="{BB962C8B-B14F-4D97-AF65-F5344CB8AC3E}">
         <p14:creationId xmlns:p14="http://schemas.microsoft.com/office/powerpoint/2010/main" val="1586520603"/>
+      </p:ext>
+    </p:extLst>
+  </p:cSld>
+  <p:clrMapOvr>
+    <a:masterClrMapping/>
+  </p:clrMapOvr>
+</p:sld>
+</file>
+
+<file path=ppt/slides/slide20.xml><?xml version="1.0" encoding="utf-8"?>
+<p:sld xmlns:a="http://schemas.openxmlformats.org/drawingml/2006/main" xmlns:r="http://schemas.openxmlformats.org/officeDocument/2006/relationships" xmlns:p="http://schemas.openxmlformats.org/presentationml/2006/main">
+  <p:cSld>
+    <p:spTree>
+      <p:nvGrpSpPr>
+        <p:cNvPr id="1" name=""/>
+        <p:cNvGrpSpPr/>
+        <p:nvPr/>
+      </p:nvGrpSpPr>
+      <p:grpSpPr>
+        <a:xfrm>
+          <a:off x="0" y="0"/>
+          <a:ext cx="0" cy="0"/>
+          <a:chOff x="0" y="0"/>
+          <a:chExt cx="0" cy="0"/>
+        </a:xfrm>
+      </p:grpSpPr>
+      <p:sp>
+        <p:nvSpPr>
+          <p:cNvPr id="3" name="Content Placeholder 2">
+            <a:extLst>
+              <a:ext uri="{FF2B5EF4-FFF2-40B4-BE49-F238E27FC236}">
+                <a16:creationId xmlns:a16="http://schemas.microsoft.com/office/drawing/2014/main" id="{B94146B9-BD72-5C56-3163-CAA22A8F3797}"/>
+              </a:ext>
+            </a:extLst>
+          </p:cNvPr>
+          <p:cNvSpPr>
+            <a:spLocks noGrp="1"/>
+          </p:cNvSpPr>
+          <p:nvPr>
+            <p:ph idx="1"/>
+          </p:nvPr>
+        </p:nvSpPr>
+        <p:spPr>
+          <a:xfrm>
+            <a:off x="1069848" y="412124"/>
+            <a:ext cx="10058400" cy="5760076"/>
+          </a:xfrm>
+        </p:spPr>
+        <p:txBody>
+          <a:bodyPr>
+            <a:normAutofit fontScale="70000" lnSpcReduction="20000"/>
+          </a:bodyPr>
+          <a:lstStyle/>
+          <a:p>
+            <a:endParaRPr lang="en-US" dirty="0"/>
+          </a:p>
+          <a:p>
+            <a:endParaRPr lang="en-US" dirty="0"/>
+          </a:p>
+          <a:p>
+            <a:endParaRPr lang="en-US" dirty="0"/>
+          </a:p>
+          <a:p>
+            <a:endParaRPr lang="en-US" dirty="0"/>
+          </a:p>
+          <a:p>
+            <a:endParaRPr lang="en-US" dirty="0"/>
+          </a:p>
+          <a:p>
+            <a:endParaRPr lang="en-US" dirty="0"/>
+          </a:p>
+          <a:p>
+            <a:endParaRPr lang="en-US" dirty="0"/>
+          </a:p>
+          <a:p>
+            <a:endParaRPr lang="en-US" dirty="0"/>
+          </a:p>
+          <a:p>
+            <a:endParaRPr lang="en-US" dirty="0"/>
+          </a:p>
+          <a:p>
+            <a:pPr marL="0" indent="0">
+              <a:buNone/>
+            </a:pPr>
+            <a:endParaRPr lang="en-US" dirty="0"/>
+          </a:p>
+          <a:p>
+            <a:pPr marL="0" indent="0">
+              <a:buNone/>
+            </a:pPr>
+            <a:endParaRPr lang="en-US" dirty="0"/>
+          </a:p>
+          <a:p>
+            <a:pPr marL="0" indent="0">
+              <a:buNone/>
+            </a:pPr>
+            <a:endParaRPr lang="en-US" dirty="0"/>
+          </a:p>
+          <a:p>
+            <a:pPr marL="0" indent="0">
+              <a:buNone/>
+            </a:pPr>
+            <a:endParaRPr lang="en-US" dirty="0"/>
+          </a:p>
+          <a:p>
+            <a:pPr marL="0" indent="0">
+              <a:buNone/>
+            </a:pPr>
+            <a:endParaRPr lang="en-IN" sz="2900" i="1" dirty="0"/>
+          </a:p>
+          <a:p>
+            <a:r>
+              <a:rPr lang="en-IN" sz="2600" i="1" dirty="0"/>
+              <a:t>We see verification status is positively correlated with both Charged off and Fully Paid. </a:t>
+            </a:r>
+          </a:p>
+          <a:p>
+            <a:r>
+              <a:rPr lang="en-IN" sz="2600" i="1" dirty="0"/>
+              <a:t>We also see if verification status is not verified then chances of becoming defaulter is higher. </a:t>
+            </a:r>
+          </a:p>
+          <a:p>
+            <a:r>
+              <a:rPr lang="en-IN" sz="2600" i="1" dirty="0"/>
+              <a:t>But percentage wise Verified also has higher chances of being defaulter.</a:t>
+            </a:r>
+            <a:br>
+              <a:rPr lang="en-IN" dirty="0"/>
+            </a:br>
+            <a:endParaRPr lang="en-IN" dirty="0"/>
+          </a:p>
+          <a:p>
+            <a:endParaRPr lang="en-US" dirty="0"/>
+          </a:p>
+        </p:txBody>
+      </p:sp>
+      <p:pic>
+        <p:nvPicPr>
+          <p:cNvPr id="7" name="Picture 6">
+            <a:extLst>
+              <a:ext uri="{FF2B5EF4-FFF2-40B4-BE49-F238E27FC236}">
+                <a16:creationId xmlns:a16="http://schemas.microsoft.com/office/drawing/2014/main" id="{4C8883B9-89A5-D7EC-84AD-B1B50F223BF1}"/>
+              </a:ext>
+            </a:extLst>
+          </p:cNvPr>
+          <p:cNvPicPr>
+            <a:picLocks noChangeAspect="1"/>
+          </p:cNvPicPr>
+          <p:nvPr/>
+        </p:nvPicPr>
+        <p:blipFill>
+          <a:blip r:embed="rId2"/>
+          <a:stretch>
+            <a:fillRect/>
+          </a:stretch>
+        </p:blipFill>
+        <p:spPr>
+          <a:xfrm>
+            <a:off x="679450" y="323850"/>
+            <a:ext cx="10833100" cy="3926178"/>
+          </a:xfrm>
+          <a:prstGeom prst="rect">
+            <a:avLst/>
+          </a:prstGeom>
+        </p:spPr>
+      </p:pic>
+    </p:spTree>
+    <p:extLst>
+      <p:ext uri="{BB962C8B-B14F-4D97-AF65-F5344CB8AC3E}">
+        <p14:creationId xmlns:p14="http://schemas.microsoft.com/office/powerpoint/2010/main" val="4270051648"/>
+      </p:ext>
+    </p:extLst>
+  </p:cSld>
+  <p:clrMapOvr>
+    <a:masterClrMapping/>
+  </p:clrMapOvr>
+</p:sld>
+</file>
+
+<file path=ppt/slides/slide21.xml><?xml version="1.0" encoding="utf-8"?>
+<p:sld xmlns:a="http://schemas.openxmlformats.org/drawingml/2006/main" xmlns:r="http://schemas.openxmlformats.org/officeDocument/2006/relationships" xmlns:p="http://schemas.openxmlformats.org/presentationml/2006/main">
+  <p:cSld>
+    <p:spTree>
+      <p:nvGrpSpPr>
+        <p:cNvPr id="1" name=""/>
+        <p:cNvGrpSpPr/>
+        <p:nvPr/>
+      </p:nvGrpSpPr>
+      <p:grpSpPr>
+        <a:xfrm>
+          <a:off x="0" y="0"/>
+          <a:ext cx="0" cy="0"/>
+          <a:chOff x="0" y="0"/>
+          <a:chExt cx="0" cy="0"/>
+        </a:xfrm>
+      </p:grpSpPr>
+      <p:sp>
+        <p:nvSpPr>
+          <p:cNvPr id="3" name="Content Placeholder 2">
+            <a:extLst>
+              <a:ext uri="{FF2B5EF4-FFF2-40B4-BE49-F238E27FC236}">
+                <a16:creationId xmlns:a16="http://schemas.microsoft.com/office/drawing/2014/main" id="{B94146B9-BD72-5C56-3163-CAA22A8F3797}"/>
+              </a:ext>
+            </a:extLst>
+          </p:cNvPr>
+          <p:cNvSpPr>
+            <a:spLocks noGrp="1"/>
+          </p:cNvSpPr>
+          <p:nvPr>
+            <p:ph idx="1"/>
+          </p:nvPr>
+        </p:nvSpPr>
+        <p:spPr>
+          <a:xfrm>
+            <a:off x="1069848" y="412124"/>
+            <a:ext cx="10058400" cy="5760076"/>
+          </a:xfrm>
+        </p:spPr>
+        <p:txBody>
+          <a:bodyPr>
+            <a:normAutofit fontScale="77500" lnSpcReduction="20000"/>
+          </a:bodyPr>
+          <a:lstStyle/>
+          <a:p>
+            <a:endParaRPr lang="en-US" dirty="0"/>
+          </a:p>
+          <a:p>
+            <a:endParaRPr lang="en-US" dirty="0"/>
+          </a:p>
+          <a:p>
+            <a:endParaRPr lang="en-US" dirty="0"/>
+          </a:p>
+          <a:p>
+            <a:endParaRPr lang="en-US" dirty="0"/>
+          </a:p>
+          <a:p>
+            <a:endParaRPr lang="en-US" dirty="0"/>
+          </a:p>
+          <a:p>
+            <a:endParaRPr lang="en-US" dirty="0"/>
+          </a:p>
+          <a:p>
+            <a:endParaRPr lang="en-US" dirty="0"/>
+          </a:p>
+          <a:p>
+            <a:endParaRPr lang="en-US" dirty="0"/>
+          </a:p>
+          <a:p>
+            <a:endParaRPr lang="en-US" dirty="0"/>
+          </a:p>
+          <a:p>
+            <a:pPr marL="0" indent="0">
+              <a:buNone/>
+            </a:pPr>
+            <a:endParaRPr lang="en-US" dirty="0"/>
+          </a:p>
+          <a:p>
+            <a:pPr marL="0" indent="0">
+              <a:buNone/>
+            </a:pPr>
+            <a:endParaRPr lang="en-US" dirty="0"/>
+          </a:p>
+          <a:p>
+            <a:pPr marL="0" indent="0">
+              <a:buNone/>
+            </a:pPr>
+            <a:endParaRPr lang="en-US" dirty="0"/>
+          </a:p>
+          <a:p>
+            <a:pPr marL="0" indent="0">
+              <a:buNone/>
+            </a:pPr>
+            <a:endParaRPr lang="en-US" dirty="0"/>
+          </a:p>
+          <a:p>
+            <a:pPr marL="0" indent="0">
+              <a:buNone/>
+            </a:pPr>
+            <a:endParaRPr lang="en-IN" sz="2900" i="1" dirty="0"/>
+          </a:p>
+          <a:p>
+            <a:r>
+              <a:rPr lang="en-IN" sz="2600" i="1" dirty="0"/>
+              <a:t>We see Loan Issue month is positively correlated with both Charged off and Fully Paid. </a:t>
+            </a:r>
+          </a:p>
+          <a:p>
+            <a:r>
+              <a:rPr lang="en-IN" sz="2600" i="1" dirty="0"/>
+              <a:t>We also see if loan issue month is either Dec or Nov, then chances of becoming defaulter is higher. </a:t>
+            </a:r>
+            <a:br>
+              <a:rPr lang="en-IN" sz="2600" dirty="0"/>
+            </a:br>
+            <a:endParaRPr lang="en-IN" sz="2600" dirty="0"/>
+          </a:p>
+          <a:p>
+            <a:endParaRPr lang="en-US" dirty="0"/>
+          </a:p>
+        </p:txBody>
+      </p:sp>
+      <p:pic>
+        <p:nvPicPr>
+          <p:cNvPr id="5" name="Picture 4" descr="Chart, bar chart&#10;&#10;Description automatically generated">
+            <a:extLst>
+              <a:ext uri="{FF2B5EF4-FFF2-40B4-BE49-F238E27FC236}">
+                <a16:creationId xmlns:a16="http://schemas.microsoft.com/office/drawing/2014/main" id="{3D22144A-7036-5F4E-0194-171A00D71D4D}"/>
+              </a:ext>
+            </a:extLst>
+          </p:cNvPr>
+          <p:cNvPicPr>
+            <a:picLocks noChangeAspect="1"/>
+          </p:cNvPicPr>
+          <p:nvPr/>
+        </p:nvPicPr>
+        <p:blipFill>
+          <a:blip r:embed="rId2"/>
+          <a:stretch>
+            <a:fillRect/>
+          </a:stretch>
+        </p:blipFill>
+        <p:spPr>
+          <a:xfrm>
+            <a:off x="762000" y="285750"/>
+            <a:ext cx="10668000" cy="4234735"/>
+          </a:xfrm>
+          <a:prstGeom prst="rect">
+            <a:avLst/>
+          </a:prstGeom>
+        </p:spPr>
+      </p:pic>
+    </p:spTree>
+    <p:extLst>
+      <p:ext uri="{BB962C8B-B14F-4D97-AF65-F5344CB8AC3E}">
+        <p14:creationId xmlns:p14="http://schemas.microsoft.com/office/powerpoint/2010/main" val="43861733"/>
+      </p:ext>
+    </p:extLst>
+  </p:cSld>
+  <p:clrMapOvr>
+    <a:masterClrMapping/>
+  </p:clrMapOvr>
+</p:sld>
+</file>
+
+<file path=ppt/slides/slide22.xml><?xml version="1.0" encoding="utf-8"?>
+<p:sld xmlns:a="http://schemas.openxmlformats.org/drawingml/2006/main" xmlns:r="http://schemas.openxmlformats.org/officeDocument/2006/relationships" xmlns:p="http://schemas.openxmlformats.org/presentationml/2006/main">
+  <p:cSld>
+    <p:spTree>
+      <p:nvGrpSpPr>
+        <p:cNvPr id="1" name=""/>
+        <p:cNvGrpSpPr/>
+        <p:nvPr/>
+      </p:nvGrpSpPr>
+      <p:grpSpPr>
+        <a:xfrm>
+          <a:off x="0" y="0"/>
+          <a:ext cx="0" cy="0"/>
+          <a:chOff x="0" y="0"/>
+          <a:chExt cx="0" cy="0"/>
+        </a:xfrm>
+      </p:grpSpPr>
+      <p:sp>
+        <p:nvSpPr>
+          <p:cNvPr id="3" name="Content Placeholder 2">
+            <a:extLst>
+              <a:ext uri="{FF2B5EF4-FFF2-40B4-BE49-F238E27FC236}">
+                <a16:creationId xmlns:a16="http://schemas.microsoft.com/office/drawing/2014/main" id="{B94146B9-BD72-5C56-3163-CAA22A8F3797}"/>
+              </a:ext>
+            </a:extLst>
+          </p:cNvPr>
+          <p:cNvSpPr>
+            <a:spLocks noGrp="1"/>
+          </p:cNvSpPr>
+          <p:nvPr>
+            <p:ph idx="1"/>
+          </p:nvPr>
+        </p:nvSpPr>
+        <p:spPr>
+          <a:xfrm>
+            <a:off x="1069848" y="412124"/>
+            <a:ext cx="10058400" cy="5760076"/>
+          </a:xfrm>
+        </p:spPr>
+        <p:txBody>
+          <a:bodyPr>
+            <a:normAutofit fontScale="92500" lnSpcReduction="20000"/>
+          </a:bodyPr>
+          <a:lstStyle/>
+          <a:p>
+            <a:endParaRPr lang="en-US" dirty="0"/>
+          </a:p>
+          <a:p>
+            <a:endParaRPr lang="en-US" dirty="0"/>
+          </a:p>
+          <a:p>
+            <a:endParaRPr lang="en-US" dirty="0"/>
+          </a:p>
+          <a:p>
+            <a:endParaRPr lang="en-US" dirty="0"/>
+          </a:p>
+          <a:p>
+            <a:endParaRPr lang="en-US" dirty="0"/>
+          </a:p>
+          <a:p>
+            <a:endParaRPr lang="en-US" dirty="0"/>
+          </a:p>
+          <a:p>
+            <a:endParaRPr lang="en-US" dirty="0"/>
+          </a:p>
+          <a:p>
+            <a:endParaRPr lang="en-US" dirty="0"/>
+          </a:p>
+          <a:p>
+            <a:endParaRPr lang="en-US" dirty="0"/>
+          </a:p>
+          <a:p>
+            <a:pPr marL="0" indent="0">
+              <a:buNone/>
+            </a:pPr>
+            <a:endParaRPr lang="en-US" dirty="0"/>
+          </a:p>
+          <a:p>
+            <a:pPr marL="0" indent="0">
+              <a:buNone/>
+            </a:pPr>
+            <a:endParaRPr lang="en-US" dirty="0"/>
+          </a:p>
+          <a:p>
+            <a:pPr marL="0" indent="0">
+              <a:buNone/>
+            </a:pPr>
+            <a:endParaRPr lang="en-US" dirty="0"/>
+          </a:p>
+          <a:p>
+            <a:pPr marL="0" indent="0">
+              <a:buNone/>
+            </a:pPr>
+            <a:endParaRPr lang="en-IN" sz="2900" i="1" dirty="0"/>
+          </a:p>
+          <a:p>
+            <a:r>
+              <a:rPr lang="en-IN" sz="1900" dirty="0"/>
+              <a:t>We see purpose is positively correlated with both Charged off and Fully Paid. </a:t>
+            </a:r>
+          </a:p>
+          <a:p>
+            <a:r>
+              <a:rPr lang="en-IN" sz="1900" dirty="0"/>
+              <a:t>We also see if purpose is </a:t>
+            </a:r>
+            <a:r>
+              <a:rPr lang="en-IN" sz="1900" dirty="0" err="1"/>
+              <a:t>debt_consolidation</a:t>
+            </a:r>
+            <a:r>
+              <a:rPr lang="en-IN" sz="1900" dirty="0"/>
+              <a:t>,  then chances of becoming defaulter is higher. </a:t>
+            </a:r>
+            <a:br>
+              <a:rPr lang="en-IN" dirty="0"/>
+            </a:br>
+            <a:endParaRPr lang="en-IN" dirty="0"/>
+          </a:p>
+          <a:p>
+            <a:endParaRPr lang="en-US" dirty="0"/>
+          </a:p>
+        </p:txBody>
+      </p:sp>
+      <p:pic>
+        <p:nvPicPr>
+          <p:cNvPr id="5" name="Picture 4" descr="Chart&#10;&#10;Description automatically generated with medium confidence">
+            <a:extLst>
+              <a:ext uri="{FF2B5EF4-FFF2-40B4-BE49-F238E27FC236}">
+                <a16:creationId xmlns:a16="http://schemas.microsoft.com/office/drawing/2014/main" id="{6E0CF387-9B55-EF09-4877-732B7D01BAF5}"/>
+              </a:ext>
+            </a:extLst>
+          </p:cNvPr>
+          <p:cNvPicPr>
+            <a:picLocks noChangeAspect="1"/>
+          </p:cNvPicPr>
+          <p:nvPr/>
+        </p:nvPicPr>
+        <p:blipFill>
+          <a:blip r:embed="rId2"/>
+          <a:stretch>
+            <a:fillRect/>
+          </a:stretch>
+        </p:blipFill>
+        <p:spPr>
+          <a:xfrm>
+            <a:off x="742950" y="317500"/>
+            <a:ext cx="10706100" cy="4293137"/>
+          </a:xfrm>
+          <a:prstGeom prst="rect">
+            <a:avLst/>
+          </a:prstGeom>
+        </p:spPr>
+      </p:pic>
+    </p:spTree>
+    <p:extLst>
+      <p:ext uri="{BB962C8B-B14F-4D97-AF65-F5344CB8AC3E}">
+        <p14:creationId xmlns:p14="http://schemas.microsoft.com/office/powerpoint/2010/main" val="2196855906"/>
+      </p:ext>
+    </p:extLst>
+  </p:cSld>
+  <p:clrMapOvr>
+    <a:masterClrMapping/>
+  </p:clrMapOvr>
+</p:sld>
+</file>
+
+<file path=ppt/slides/slide23.xml><?xml version="1.0" encoding="utf-8"?>
+<p:sld xmlns:a="http://schemas.openxmlformats.org/drawingml/2006/main" xmlns:r="http://schemas.openxmlformats.org/officeDocument/2006/relationships" xmlns:p="http://schemas.openxmlformats.org/presentationml/2006/main">
+  <p:cSld>
+    <p:spTree>
+      <p:nvGrpSpPr>
+        <p:cNvPr id="1" name=""/>
+        <p:cNvGrpSpPr/>
+        <p:nvPr/>
+      </p:nvGrpSpPr>
+      <p:grpSpPr>
+        <a:xfrm>
+          <a:off x="0" y="0"/>
+          <a:ext cx="0" cy="0"/>
+          <a:chOff x="0" y="0"/>
+          <a:chExt cx="0" cy="0"/>
+        </a:xfrm>
+      </p:grpSpPr>
+      <p:sp>
+        <p:nvSpPr>
+          <p:cNvPr id="3" name="Content Placeholder 2">
+            <a:extLst>
+              <a:ext uri="{FF2B5EF4-FFF2-40B4-BE49-F238E27FC236}">
+                <a16:creationId xmlns:a16="http://schemas.microsoft.com/office/drawing/2014/main" id="{B94146B9-BD72-5C56-3163-CAA22A8F3797}"/>
+              </a:ext>
+            </a:extLst>
+          </p:cNvPr>
+          <p:cNvSpPr>
+            <a:spLocks noGrp="1"/>
+          </p:cNvSpPr>
+          <p:nvPr>
+            <p:ph idx="1"/>
+          </p:nvPr>
+        </p:nvSpPr>
+        <p:spPr>
+          <a:xfrm>
+            <a:off x="1069848" y="412124"/>
+            <a:ext cx="10058400" cy="5760076"/>
+          </a:xfrm>
+        </p:spPr>
+        <p:txBody>
+          <a:bodyPr>
+            <a:normAutofit fontScale="85000" lnSpcReduction="20000"/>
+          </a:bodyPr>
+          <a:lstStyle/>
+          <a:p>
+            <a:endParaRPr lang="en-US" dirty="0"/>
+          </a:p>
+          <a:p>
+            <a:endParaRPr lang="en-US" dirty="0"/>
+          </a:p>
+          <a:p>
+            <a:endParaRPr lang="en-US" dirty="0"/>
+          </a:p>
+          <a:p>
+            <a:endParaRPr lang="en-US" dirty="0"/>
+          </a:p>
+          <a:p>
+            <a:endParaRPr lang="en-US" dirty="0"/>
+          </a:p>
+          <a:p>
+            <a:endParaRPr lang="en-US" dirty="0"/>
+          </a:p>
+          <a:p>
+            <a:endParaRPr lang="en-US" dirty="0"/>
+          </a:p>
+          <a:p>
+            <a:endParaRPr lang="en-US" dirty="0"/>
+          </a:p>
+          <a:p>
+            <a:endParaRPr lang="en-US" dirty="0"/>
+          </a:p>
+          <a:p>
+            <a:pPr marL="0" indent="0">
+              <a:buNone/>
+            </a:pPr>
+            <a:endParaRPr lang="en-US" dirty="0"/>
+          </a:p>
+          <a:p>
+            <a:pPr marL="0" indent="0">
+              <a:buNone/>
+            </a:pPr>
+            <a:endParaRPr lang="en-US" dirty="0"/>
+          </a:p>
+          <a:p>
+            <a:pPr marL="0" indent="0">
+              <a:buNone/>
+            </a:pPr>
+            <a:endParaRPr lang="en-US" dirty="0"/>
+          </a:p>
+          <a:p>
+            <a:pPr marL="0" indent="0">
+              <a:buNone/>
+            </a:pPr>
+            <a:endParaRPr lang="en-IN" sz="2900" i="1" dirty="0"/>
+          </a:p>
+          <a:p>
+            <a:r>
+              <a:rPr lang="en-IN" sz="2100" dirty="0"/>
+              <a:t> We see number of public record bankruptcies is positively correlated with both Charged off and Fully Paid. </a:t>
+            </a:r>
+          </a:p>
+          <a:p>
+            <a:r>
+              <a:rPr lang="en-IN" sz="2100" dirty="0"/>
+              <a:t>We also see if number of public record bankruptcies is 0 then chances of becoming defaulter is higher.</a:t>
+            </a:r>
+            <a:br>
+              <a:rPr lang="en-IN" sz="2100" dirty="0"/>
+            </a:br>
+            <a:endParaRPr lang="en-IN" sz="2100" dirty="0"/>
+          </a:p>
+          <a:p>
+            <a:endParaRPr lang="en-US" dirty="0"/>
+          </a:p>
+        </p:txBody>
+      </p:sp>
+      <p:pic>
+        <p:nvPicPr>
+          <p:cNvPr id="4" name="Picture 3" descr="Chart, waterfall chart&#10;&#10;Description automatically generated">
+            <a:extLst>
+              <a:ext uri="{FF2B5EF4-FFF2-40B4-BE49-F238E27FC236}">
+                <a16:creationId xmlns:a16="http://schemas.microsoft.com/office/drawing/2014/main" id="{DE08CC62-52A1-52A5-C411-E048B84B532C}"/>
+              </a:ext>
+            </a:extLst>
+          </p:cNvPr>
+          <p:cNvPicPr>
+            <a:picLocks noChangeAspect="1"/>
+          </p:cNvPicPr>
+          <p:nvPr/>
+        </p:nvPicPr>
+        <p:blipFill>
+          <a:blip r:embed="rId2"/>
+          <a:stretch>
+            <a:fillRect/>
+          </a:stretch>
+        </p:blipFill>
+        <p:spPr>
+          <a:xfrm>
+            <a:off x="685800" y="311150"/>
+            <a:ext cx="10820400" cy="4428275"/>
+          </a:xfrm>
+          <a:prstGeom prst="rect">
+            <a:avLst/>
+          </a:prstGeom>
+        </p:spPr>
+      </p:pic>
+    </p:spTree>
+    <p:extLst>
+      <p:ext uri="{BB962C8B-B14F-4D97-AF65-F5344CB8AC3E}">
+        <p14:creationId xmlns:p14="http://schemas.microsoft.com/office/powerpoint/2010/main" val="567688255"/>
+      </p:ext>
+    </p:extLst>
+  </p:cSld>
+  <p:clrMapOvr>
+    <a:masterClrMapping/>
+  </p:clrMapOvr>
+</p:sld>
+</file>
+
+<file path=ppt/slides/slide24.xml><?xml version="1.0" encoding="utf-8"?>
+<p:sld xmlns:a="http://schemas.openxmlformats.org/drawingml/2006/main" xmlns:r="http://schemas.openxmlformats.org/officeDocument/2006/relationships" xmlns:p="http://schemas.openxmlformats.org/presentationml/2006/main">
+  <p:cSld>
+    <p:spTree>
+      <p:nvGrpSpPr>
+        <p:cNvPr id="1" name=""/>
+        <p:cNvGrpSpPr/>
+        <p:nvPr/>
+      </p:nvGrpSpPr>
+      <p:grpSpPr>
+        <a:xfrm>
+          <a:off x="0" y="0"/>
+          <a:ext cx="0" cy="0"/>
+          <a:chOff x="0" y="0"/>
+          <a:chExt cx="0" cy="0"/>
+        </a:xfrm>
+      </p:grpSpPr>
+      <p:sp>
+        <p:nvSpPr>
+          <p:cNvPr id="3" name="Content Placeholder 2">
+            <a:extLst>
+              <a:ext uri="{FF2B5EF4-FFF2-40B4-BE49-F238E27FC236}">
+                <a16:creationId xmlns:a16="http://schemas.microsoft.com/office/drawing/2014/main" id="{B94146B9-BD72-5C56-3163-CAA22A8F3797}"/>
+              </a:ext>
+            </a:extLst>
+          </p:cNvPr>
+          <p:cNvSpPr>
+            <a:spLocks noGrp="1"/>
+          </p:cNvSpPr>
+          <p:nvPr>
+            <p:ph idx="1"/>
+          </p:nvPr>
+        </p:nvSpPr>
+        <p:spPr>
+          <a:xfrm>
+            <a:off x="1069848" y="412124"/>
+            <a:ext cx="10058400" cy="5760076"/>
+          </a:xfrm>
+        </p:spPr>
+        <p:txBody>
+          <a:bodyPr>
+            <a:normAutofit fontScale="85000" lnSpcReduction="20000"/>
+          </a:bodyPr>
+          <a:lstStyle/>
+          <a:p>
+            <a:endParaRPr lang="en-US" dirty="0"/>
+          </a:p>
+          <a:p>
+            <a:endParaRPr lang="en-US" dirty="0"/>
+          </a:p>
+          <a:p>
+            <a:endParaRPr lang="en-US" dirty="0"/>
+          </a:p>
+          <a:p>
+            <a:endParaRPr lang="en-US" dirty="0"/>
+          </a:p>
+          <a:p>
+            <a:endParaRPr lang="en-US" dirty="0"/>
+          </a:p>
+          <a:p>
+            <a:endParaRPr lang="en-US" dirty="0"/>
+          </a:p>
+          <a:p>
+            <a:endParaRPr lang="en-US" dirty="0"/>
+          </a:p>
+          <a:p>
+            <a:endParaRPr lang="en-US" dirty="0"/>
+          </a:p>
+          <a:p>
+            <a:endParaRPr lang="en-US" dirty="0"/>
+          </a:p>
+          <a:p>
+            <a:pPr marL="0" indent="0">
+              <a:buNone/>
+            </a:pPr>
+            <a:endParaRPr lang="en-US" dirty="0"/>
+          </a:p>
+          <a:p>
+            <a:pPr marL="0" indent="0">
+              <a:buNone/>
+            </a:pPr>
+            <a:endParaRPr lang="en-US" dirty="0"/>
+          </a:p>
+          <a:p>
+            <a:pPr marL="0" indent="0">
+              <a:buNone/>
+            </a:pPr>
+            <a:endParaRPr lang="en-US" dirty="0"/>
+          </a:p>
+          <a:p>
+            <a:pPr marL="0" indent="0">
+              <a:buNone/>
+            </a:pPr>
+            <a:endParaRPr lang="en-IN" sz="2900" i="1" dirty="0"/>
+          </a:p>
+          <a:p>
+            <a:endParaRPr lang="en-IN" sz="1900" dirty="0"/>
+          </a:p>
+          <a:p>
+            <a:r>
+              <a:rPr lang="en-IN" sz="1900" dirty="0"/>
+              <a:t>We plotted this plot/heatmap to show correlation of different features.</a:t>
+            </a:r>
+          </a:p>
+          <a:p>
+            <a:pPr marL="0" indent="0">
+              <a:buNone/>
+            </a:pPr>
+            <a:br>
+              <a:rPr lang="en-IN" dirty="0"/>
+            </a:br>
+            <a:endParaRPr lang="en-IN" dirty="0"/>
+          </a:p>
+          <a:p>
+            <a:endParaRPr lang="en-US" dirty="0"/>
+          </a:p>
+        </p:txBody>
+      </p:sp>
+      <p:pic>
+        <p:nvPicPr>
+          <p:cNvPr id="7" name="Picture 6" descr="Chart&#10;&#10;Description automatically generated">
+            <a:extLst>
+              <a:ext uri="{FF2B5EF4-FFF2-40B4-BE49-F238E27FC236}">
+                <a16:creationId xmlns:a16="http://schemas.microsoft.com/office/drawing/2014/main" id="{A94766A4-7E97-03CA-7586-63DA0344020D}"/>
+              </a:ext>
+            </a:extLst>
+          </p:cNvPr>
+          <p:cNvPicPr>
+            <a:picLocks noChangeAspect="1"/>
+          </p:cNvPicPr>
+          <p:nvPr/>
+        </p:nvPicPr>
+        <p:blipFill>
+          <a:blip r:embed="rId2"/>
+          <a:stretch>
+            <a:fillRect/>
+          </a:stretch>
+        </p:blipFill>
+        <p:spPr>
+          <a:xfrm>
+            <a:off x="1403797" y="0"/>
+            <a:ext cx="8577330" cy="5100034"/>
+          </a:xfrm>
+          <a:prstGeom prst="rect">
+            <a:avLst/>
+          </a:prstGeom>
+        </p:spPr>
+      </p:pic>
+    </p:spTree>
+    <p:extLst>
+      <p:ext uri="{BB962C8B-B14F-4D97-AF65-F5344CB8AC3E}">
+        <p14:creationId xmlns:p14="http://schemas.microsoft.com/office/powerpoint/2010/main" val="3737799869"/>
+      </p:ext>
+    </p:extLst>
+  </p:cSld>
+  <p:clrMapOvr>
+    <a:masterClrMapping/>
+  </p:clrMapOvr>
+</p:sld>
+</file>
+
+<file path=ppt/slides/slide25.xml><?xml version="1.0" encoding="utf-8"?>
+<p:sld xmlns:a="http://schemas.openxmlformats.org/drawingml/2006/main" xmlns:r="http://schemas.openxmlformats.org/officeDocument/2006/relationships" xmlns:p="http://schemas.openxmlformats.org/presentationml/2006/main">
+  <p:cSld>
+    <p:spTree>
+      <p:nvGrpSpPr>
+        <p:cNvPr id="1" name=""/>
+        <p:cNvGrpSpPr/>
+        <p:nvPr/>
+      </p:nvGrpSpPr>
+      <p:grpSpPr>
+        <a:xfrm>
+          <a:off x="0" y="0"/>
+          <a:ext cx="0" cy="0"/>
+          <a:chOff x="0" y="0"/>
+          <a:chExt cx="0" cy="0"/>
+        </a:xfrm>
+      </p:grpSpPr>
+      <p:sp>
+        <p:nvSpPr>
+          <p:cNvPr id="3" name="Content Placeholder 2">
+            <a:extLst>
+              <a:ext uri="{FF2B5EF4-FFF2-40B4-BE49-F238E27FC236}">
+                <a16:creationId xmlns:a16="http://schemas.microsoft.com/office/drawing/2014/main" id="{62160314-4633-F7DD-3570-605416EACBAD}"/>
+              </a:ext>
+            </a:extLst>
+          </p:cNvPr>
+          <p:cNvSpPr>
+            <a:spLocks noGrp="1"/>
+          </p:cNvSpPr>
+          <p:nvPr>
+            <p:ph idx="1"/>
+          </p:nvPr>
+        </p:nvSpPr>
+        <p:spPr>
+          <a:xfrm>
+            <a:off x="1069848" y="566670"/>
+            <a:ext cx="10058400" cy="5605530"/>
+          </a:xfrm>
+        </p:spPr>
+        <p:txBody>
+          <a:bodyPr>
+            <a:noAutofit/>
+          </a:bodyPr>
+          <a:lstStyle/>
+          <a:p>
+            <a:r>
+              <a:rPr lang="en-US" sz="1800" b="1" dirty="0"/>
+              <a:t>Summary based on this correlation heatmap:</a:t>
+            </a:r>
+          </a:p>
+          <a:p>
+            <a:r>
+              <a:rPr lang="en-US" sz="1600" dirty="0"/>
+              <a:t>Negatively correlated features</a:t>
+            </a:r>
+          </a:p>
+          <a:p>
+            <a:pPr lvl="1"/>
+            <a:r>
+              <a:rPr lang="en-US" sz="1600" dirty="0"/>
+              <a:t>Home ownership, borrower’s annual income and verification status are negatively correlated with defaulter.</a:t>
+            </a:r>
+          </a:p>
+          <a:p>
+            <a:pPr marL="891540" lvl="2" indent="-342900">
+              <a:buFont typeface="+mj-lt"/>
+              <a:buAutoNum type="alphaLcPeriod"/>
+            </a:pPr>
+            <a:r>
+              <a:rPr lang="en-US" dirty="0"/>
+              <a:t>If home ownership is “RENT” or “Mortgage”, then chances of becoming defaulter is higher.</a:t>
+            </a:r>
+          </a:p>
+          <a:p>
+            <a:pPr marL="891540" lvl="2" indent="-342900">
+              <a:buFont typeface="+mj-lt"/>
+              <a:buAutoNum type="alphaLcPeriod"/>
+            </a:pPr>
+            <a:r>
+              <a:rPr lang="en-US" dirty="0"/>
+              <a:t>If verification status is “Verified”,  then chances of becoming defaulter is higher.</a:t>
+            </a:r>
+          </a:p>
+          <a:p>
+            <a:pPr marL="891540" lvl="2" indent="-342900">
+              <a:buFont typeface="+mj-lt"/>
+              <a:buAutoNum type="alphaLcPeriod"/>
+            </a:pPr>
+            <a:r>
+              <a:rPr lang="en-US" dirty="0"/>
+              <a:t>For Annual income ,  looking at the ratio of say charged off/ Fully Paid, say for 0-20000 range, has higher chances of becoming defaulter. Heatmap is also confirming this.</a:t>
+            </a:r>
+          </a:p>
+          <a:p>
+            <a:pPr marL="548640" lvl="2" indent="0">
+              <a:buNone/>
+            </a:pPr>
+            <a:endParaRPr lang="en-US" sz="1600" dirty="0"/>
+          </a:p>
+          <a:p>
+            <a:r>
+              <a:rPr lang="en-US" sz="1600" dirty="0"/>
+              <a:t>Positively corelated features</a:t>
+            </a:r>
+          </a:p>
+          <a:p>
+            <a:pPr lvl="1"/>
+            <a:r>
+              <a:rPr lang="en-US" sz="1600" dirty="0"/>
+              <a:t>Key features which are positively corelated are term, interest rate and grade .</a:t>
+            </a:r>
+          </a:p>
+          <a:p>
+            <a:pPr lvl="1"/>
+            <a:r>
+              <a:rPr lang="en-US" sz="1600" dirty="0"/>
+              <a:t>Other remaining features are also positively corelated,  but the extent of correlation is less as compared to term, interest rate and grade.</a:t>
+            </a:r>
+          </a:p>
+          <a:p>
+            <a:pPr marL="777240" lvl="2" indent="-228600">
+              <a:buFont typeface="+mj-lt"/>
+              <a:buAutoNum type="alphaLcPeriod"/>
+            </a:pPr>
+            <a:r>
+              <a:rPr lang="en-US" dirty="0"/>
+              <a:t>So higher the term, greater will be chances of becoming defaulter. Hence 60 months is the likely term with more percentage of defaulters.</a:t>
+            </a:r>
+          </a:p>
+          <a:p>
+            <a:pPr marL="777240" lvl="2" indent="-228600">
+              <a:buFont typeface="+mj-lt"/>
+              <a:buAutoNum type="alphaLcPeriod"/>
+            </a:pPr>
+            <a:r>
+              <a:rPr lang="en-US" dirty="0"/>
+              <a:t>Higher the interest rate means higher the chances of becoming defaulter. Hence likely range with higher percent of defaulters would be 21-25% </a:t>
+            </a:r>
+          </a:p>
+          <a:p>
+            <a:pPr marL="777240" lvl="2" indent="-228600">
+              <a:buFont typeface="+mj-lt"/>
+              <a:buAutoNum type="alphaLcPeriod"/>
+            </a:pPr>
+            <a:r>
+              <a:rPr lang="en-US" dirty="0"/>
+              <a:t>Higher the grade means higher the chances of becoming defaulter. Hence grade G is likely range with higher percent of defaulters.</a:t>
+            </a:r>
+          </a:p>
+        </p:txBody>
+      </p:sp>
+    </p:spTree>
+    <p:extLst>
+      <p:ext uri="{BB962C8B-B14F-4D97-AF65-F5344CB8AC3E}">
+        <p14:creationId xmlns:p14="http://schemas.microsoft.com/office/powerpoint/2010/main" val="127200780"/>
       </p:ext>
     </p:extLst>
   </p:cSld>

</xml_diff>